<commit_message>
General cleanup to solutions and presentations.
</commit_message>
<xml_diff>
--- a/Sprint3/EdaWorkshop_Sprint3.pptx
+++ b/Sprint3/EdaWorkshop_Sprint3.pptx
@@ -3101,11 +3101,7 @@
           <a:p>
             <a:r>
               <a:rPr lang="en-US" dirty="0" smtClean="0"/>
-              <a:t>Have </a:t>
-            </a:r>
-            <a:r>
-              <a:rPr lang="en-US" dirty="0" smtClean="0"/>
-              <a:t>Routing Service </a:t>
+              <a:t>Have Routing Service </a:t>
             </a:r>
             <a:r>
               <a:rPr lang="en-US" dirty="0"/>
@@ -3211,8 +3207,9 @@
             </a:pPr>
             <a:r>
               <a:rPr lang="en-US" dirty="0" smtClean="0"/>
-              <a:t>TODO</a:t>
-            </a:r>
+              <a:t> </a:t>
+            </a:r>
+            <a:endParaRPr lang="en-US" dirty="0" smtClean="0"/>
           </a:p>
         </p:txBody>
       </p:sp>
@@ -3321,8 +3318,9 @@
             </a:pPr>
             <a:r>
               <a:rPr lang="en-US" dirty="0" smtClean="0"/>
-              <a:t>TODO</a:t>
-            </a:r>
+              <a:t> </a:t>
+            </a:r>
+            <a:endParaRPr lang="en-US" dirty="0" smtClean="0"/>
           </a:p>
         </p:txBody>
       </p:sp>
@@ -3350,6 +3348,30 @@
           <a:xfrm>
             <a:off x="9135291" y="292047"/>
             <a:ext cx="2455817" cy="1381224"/>
+          </a:xfrm>
+          <a:prstGeom prst="rect">
+            <a:avLst/>
+          </a:prstGeom>
+        </p:spPr>
+      </p:pic>
+      <p:pic>
+        <p:nvPicPr>
+          <p:cNvPr id="6" name="Picture 5"/>
+          <p:cNvPicPr>
+            <a:picLocks noChangeAspect="1"/>
+          </p:cNvPicPr>
+          <p:nvPr/>
+        </p:nvPicPr>
+        <p:blipFill>
+          <a:blip r:embed="rId3"/>
+          <a:stretch>
+            <a:fillRect/>
+          </a:stretch>
+        </p:blipFill>
+        <p:spPr>
+          <a:xfrm>
+            <a:off x="3838575" y="2253456"/>
+            <a:ext cx="4514850" cy="3495675"/>
           </a:xfrm>
           <a:prstGeom prst="rect">
             <a:avLst/>

</xml_diff>